<commit_message>
Update source format: elektrobit
</commit_message>
<xml_diff>
--- a/source/whitepaper/elektrobit-ss.pptx
+++ b/source/whitepaper/elektrobit-ss.pptx
@@ -124,7 +124,7 @@
           <a:p>
             <a:fld id="{B7CE069A-27FC-F245-915E-7319C1DBAA1E}" type="datetimeFigureOut">
               <a:rPr kumimoji="1" lang="zh-CN" altLang="en-US" smtClean="0"/>
-              <a:t>2023/5/29</a:t>
+              <a:t>2023/6/9</a:t>
             </a:fld>
             <a:endParaRPr kumimoji="1" lang="zh-CN" altLang="en-US"/>
           </a:p>
@@ -5462,8 +5462,7 @@
                 <a:ea typeface="Source Han Sans CN" panose="020B0500000000000000" pitchFamily="34" charset="-128"/>
                 <a:cs typeface="Century Gothic"/>
               </a:rPr>
-              <a:t>Elektrobit: Driving the Future of
-Automotive</a:t>
+              <a:t>Elektrobit: Driving the Future of</a:t>
             </a:r>
             <a:r>
               <a:rPr lang="zh-CN" altLang="en-US" sz="2000" dirty="0">
@@ -5485,8 +5484,51 @@
                 <a:ea typeface="Source Han Sans CN" panose="020B0500000000000000" pitchFamily="34" charset="-128"/>
                 <a:cs typeface="Century Gothic"/>
               </a:rPr>
-              <a:t>with Open Source
-and SUSE</a:t>
+              <a:t>Automotive</a:t>
+            </a:r>
+            <a:r>
+              <a:rPr lang="zh-CN" altLang="en-US" sz="2000" dirty="0">
+                <a:solidFill>
+                  <a:srgbClr val="FFFFFF"/>
+                </a:solidFill>
+                <a:latin typeface="Source Han Sans CN" panose="020B0500000000000000" pitchFamily="34" charset="-128"/>
+                <a:ea typeface="Source Han Sans CN" panose="020B0500000000000000" pitchFamily="34" charset="-128"/>
+                <a:cs typeface="Century Gothic"/>
+              </a:rPr>
+              <a:t> </a:t>
+            </a:r>
+            <a:r>
+              <a:rPr sz="2000" dirty="0">
+                <a:solidFill>
+                  <a:srgbClr val="FFFFFF"/>
+                </a:solidFill>
+                <a:latin typeface="Source Han Sans CN" panose="020B0500000000000000" pitchFamily="34" charset="-128"/>
+                <a:ea typeface="Source Han Sans CN" panose="020B0500000000000000" pitchFamily="34" charset="-128"/>
+                <a:cs typeface="Century Gothic"/>
+              </a:rPr>
+              <a:t>with Open Source</a:t>
+            </a:r>
+            <a:r>
+              <a:rPr lang="zh-CN" altLang="en-US" sz="2000" dirty="0">
+                <a:solidFill>
+                  <a:srgbClr val="FFFFFF"/>
+                </a:solidFill>
+                <a:latin typeface="Source Han Sans CN" panose="020B0500000000000000" pitchFamily="34" charset="-128"/>
+                <a:ea typeface="Source Han Sans CN" panose="020B0500000000000000" pitchFamily="34" charset="-128"/>
+                <a:cs typeface="Century Gothic"/>
+              </a:rPr>
+              <a:t> </a:t>
+            </a:r>
+            <a:r>
+              <a:rPr sz="2000" dirty="0">
+                <a:solidFill>
+                  <a:srgbClr val="FFFFFF"/>
+                </a:solidFill>
+                <a:latin typeface="Source Han Sans CN" panose="020B0500000000000000" pitchFamily="34" charset="-128"/>
+                <a:ea typeface="Source Han Sans CN" panose="020B0500000000000000" pitchFamily="34" charset="-128"/>
+                <a:cs typeface="Century Gothic"/>
+              </a:rPr>
+              <a:t>and SUSE</a:t>
             </a:r>
             <a:endParaRPr sz="2000" dirty="0">
               <a:latin typeface="Source Han Sans CN" panose="020B0500000000000000" pitchFamily="34" charset="-128"/>
@@ -6365,10 +6407,10 @@
                 <a:ea typeface="Source Han Sans CN" panose="020B0500000000000000" pitchFamily="34" charset="-128"/>
                 <a:cs typeface="Century Gothic"/>
               </a:rPr>
-              <a:t>2030.</a:t>
-            </a:r>
-            <a:r>
-              <a:rPr sz="825" baseline="35353" dirty="0">
+              <a:t>2030</a:t>
+            </a:r>
+            <a:r>
+              <a:rPr lang="en-US" altLang="zh-CN" sz="1000" baseline="30000" dirty="0">
                 <a:solidFill>
                   <a:srgbClr val="231F20"/>
                 </a:solidFill>
@@ -6379,37 +6421,48 @@
               <a:t>1</a:t>
             </a:r>
             <a:r>
-              <a:rPr lang="zh-CN" altLang="en-US" sz="825" baseline="35353" dirty="0">
-                <a:solidFill>
-                  <a:srgbClr val="231F20"/>
-                </a:solidFill>
-                <a:latin typeface="Source Han Sans CN" panose="020B0500000000000000" pitchFamily="34" charset="-128"/>
-                <a:ea typeface="Source Han Sans CN" panose="020B0500000000000000" pitchFamily="34" charset="-128"/>
-                <a:cs typeface="Century Gothic"/>
-              </a:rPr>
-              <a:t> </a:t>
-            </a:r>
-            <a:r>
-              <a:rPr sz="825" baseline="35353" dirty="0">
-                <a:solidFill>
-                  <a:srgbClr val="231F20"/>
-                </a:solidFill>
-                <a:latin typeface="Source Han Sans CN" panose="020B0500000000000000" pitchFamily="34" charset="-128"/>
-                <a:ea typeface="Source Han Sans CN" panose="020B0500000000000000" pitchFamily="34" charset="-128"/>
-                <a:cs typeface="Century Gothic"/>
-              </a:rPr>
-              <a:t> </a:t>
-            </a:r>
-            <a:r>
-              <a:rPr sz="1000" dirty="0">
-                <a:solidFill>
-                  <a:srgbClr val="231F20"/>
-                </a:solidFill>
-                <a:latin typeface="Source Han Sans CN" panose="020B0500000000000000" pitchFamily="34" charset="-128"/>
-                <a:ea typeface="Source Han Sans CN" panose="020B0500000000000000" pitchFamily="34" charset="-128"/>
-                <a:cs typeface="Century Gothic"/>
-              </a:rPr>
-              <a:t>This</a:t>
+              <a:rPr lang="en-US" altLang="zh-CN" sz="1000" dirty="0">
+                <a:solidFill>
+                  <a:srgbClr val="231F20"/>
+                </a:solidFill>
+                <a:latin typeface="Source Han Sans CN" panose="020B0500000000000000" pitchFamily="34" charset="-128"/>
+                <a:ea typeface="Source Han Sans CN" panose="020B0500000000000000" pitchFamily="34" charset="-128"/>
+                <a:cs typeface="Century Gothic"/>
+              </a:rPr>
+              <a:t>.</a:t>
+            </a:r>
+            <a:r>
+              <a:rPr lang="zh-CN" altLang="en-US" sz="1000" dirty="0">
+                <a:solidFill>
+                  <a:srgbClr val="231F20"/>
+                </a:solidFill>
+                <a:latin typeface="Source Han Sans CN" panose="020B0500000000000000" pitchFamily="34" charset="-128"/>
+                <a:ea typeface="Source Han Sans CN" panose="020B0500000000000000" pitchFamily="34" charset="-128"/>
+                <a:cs typeface="Century Gothic"/>
+              </a:rPr>
+              <a:t> </a:t>
+            </a:r>
+            <a:r>
+              <a:rPr lang="en-US" altLang="zh-CN" sz="1000" dirty="0">
+                <a:solidFill>
+                  <a:srgbClr val="231F20"/>
+                </a:solidFill>
+                <a:latin typeface="Source Han Sans CN" panose="020B0500000000000000" pitchFamily="34" charset="-128"/>
+                <a:ea typeface="Source Han Sans CN" panose="020B0500000000000000" pitchFamily="34" charset="-128"/>
+                <a:cs typeface="Century Gothic"/>
+              </a:rPr>
+              <a:t>T</a:t>
+            </a:r>
+            <a:r>
+              <a:rPr sz="1000" dirty="0">
+                <a:solidFill>
+                  <a:srgbClr val="231F20"/>
+                </a:solidFill>
+                <a:latin typeface="Source Han Sans CN" panose="020B0500000000000000" pitchFamily="34" charset="-128"/>
+                <a:ea typeface="Source Han Sans CN" panose="020B0500000000000000" pitchFamily="34" charset="-128"/>
+                <a:cs typeface="Century Gothic"/>
+              </a:rPr>
+              <a:t>his</a:t>
             </a:r>
             <a:r>
               <a:rPr lang="zh-CN" altLang="en-US" sz="1000" dirty="0">
@@ -7806,7 +7859,7 @@
         <p:spPr>
           <a:xfrm>
             <a:off x="796954" y="3290333"/>
-            <a:ext cx="2828925" cy="5372176"/>
+            <a:ext cx="2828925" cy="6812058"/>
           </a:xfrm>
           <a:prstGeom prst="rect">
             <a:avLst/>
@@ -8562,26 +8615,37 @@
               </a:tabLst>
             </a:pPr>
             <a:r>
-              <a:rPr sz="1000" b="1" dirty="0">
-                <a:solidFill>
-                  <a:srgbClr val="231F20"/>
-                </a:solidFill>
-                <a:latin typeface="Source Han Sans CN" panose="020B0500000000000000" pitchFamily="34" charset="-128"/>
-                <a:ea typeface="Source Han Sans CN" panose="020B0500000000000000" pitchFamily="34" charset="-128"/>
-                <a:cs typeface="Century Gothic"/>
-              </a:rPr>
-              <a:t>Scale of Coding: </a:t>
-            </a:r>
-            <a:r>
-              <a:rPr sz="1000" dirty="0">
-                <a:solidFill>
-                  <a:srgbClr val="231F20"/>
-                </a:solidFill>
-                <a:latin typeface="Source Han Sans CN" panose="020B0500000000000000" pitchFamily="34" charset="-128"/>
-                <a:ea typeface="Source Han Sans CN" panose="020B0500000000000000" pitchFamily="34" charset="-128"/>
-                <a:cs typeface="Century Gothic"/>
-              </a:rPr>
-              <a:t>Today’s connected </a:t>
+              <a:rPr sz="1000" dirty="0">
+                <a:solidFill>
+                  <a:srgbClr val="231F20"/>
+                </a:solidFill>
+                <a:latin typeface="Source Han Sans CN" panose="020B0500000000000000" pitchFamily="34" charset="-128"/>
+                <a:ea typeface="Source Han Sans CN" panose="020B0500000000000000" pitchFamily="34" charset="-128"/>
+                <a:cs typeface="Century Gothic"/>
+              </a:rPr>
+              <a:t>Scale of Coding: Today</a:t>
+            </a:r>
+            <a:r>
+              <a:rPr lang="en-US" altLang="zh-CN" sz="1000" dirty="0">
+                <a:solidFill>
+                  <a:srgbClr val="231F20"/>
+                </a:solidFill>
+                <a:latin typeface="Source Han Sans CN" panose="020B0500000000000000" pitchFamily="34" charset="-128"/>
+                <a:ea typeface="Source Han Sans CN" panose="020B0500000000000000" pitchFamily="34" charset="-128"/>
+                <a:cs typeface="Century Gothic"/>
+              </a:rPr>
+              <a:t>'</a:t>
+            </a:r>
+            <a:r>
+              <a:rPr sz="1000" dirty="0">
+                <a:solidFill>
+                  <a:srgbClr val="231F20"/>
+                </a:solidFill>
+                <a:latin typeface="Source Han Sans CN" panose="020B0500000000000000" pitchFamily="34" charset="-128"/>
+                <a:ea typeface="Source Han Sans CN" panose="020B0500000000000000" pitchFamily="34" charset="-128"/>
+                <a:cs typeface="Century Gothic"/>
+              </a:rPr>
+              <a:t>s connected </a:t>
             </a:r>
             <a:r>
               <a:rPr sz="1000" dirty="0" err="1">
@@ -8605,18 +8669,14 @@
               </a:rPr>
               <a:t> on 100 million lines of code. Adding</a:t>
             </a:r>
-            <a:endParaRPr sz="1000" dirty="0">
-              <a:latin typeface="Source Han Sans CN" panose="020B0500000000000000" pitchFamily="34" charset="-128"/>
-              <a:ea typeface="Source Han Sans CN" panose="020B0500000000000000" pitchFamily="34" charset="-128"/>
-              <a:cs typeface="Century Gothic"/>
-            </a:endParaRPr>
-          </a:p>
-          <a:p>
-            <a:pPr marL="152400" marR="260985" algn="l">
-              <a:lnSpc>
-                <a:spcPct val="116700"/>
-              </a:lnSpc>
-            </a:pPr>
+            <a:r>
+              <a:rPr lang="zh-CN" altLang="en-US" sz="1000" dirty="0">
+                <a:latin typeface="Source Han Sans CN" panose="020B0500000000000000" pitchFamily="34" charset="-128"/>
+                <a:ea typeface="Source Han Sans CN" panose="020B0500000000000000" pitchFamily="34" charset="-128"/>
+                <a:cs typeface="Century Gothic"/>
+              </a:rPr>
+              <a:t> </a:t>
+            </a:r>
             <a:r>
               <a:rPr sz="1000" dirty="0">
                 <a:solidFill>
@@ -8648,8 +8708,29 @@
                 <a:ea typeface="Source Han Sans CN" panose="020B0500000000000000" pitchFamily="34" charset="-128"/>
                 <a:cs typeface="Century Gothic"/>
               </a:rPr>
-              <a:t>automation
-would be hugely complex.</a:t>
+              <a:t>automation</a:t>
+            </a:r>
+            <a:r>
+              <a:rPr lang="zh-CN" altLang="en-US" sz="1000" dirty="0">
+                <a:solidFill>
+                  <a:srgbClr val="231F20"/>
+                </a:solidFill>
+                <a:latin typeface="Source Han Sans CN" panose="020B0500000000000000" pitchFamily="34" charset="-128"/>
+                <a:ea typeface="Source Han Sans CN" panose="020B0500000000000000" pitchFamily="34" charset="-128"/>
+                <a:cs typeface="Century Gothic"/>
+              </a:rPr>
+              <a:t> </a:t>
+            </a:r>
+            <a:r>
+              <a:rPr sz="1000" dirty="0">
+                <a:solidFill>
+                  <a:srgbClr val="231F20"/>
+                </a:solidFill>
+                <a:latin typeface="Source Han Sans CN" panose="020B0500000000000000" pitchFamily="34" charset="-128"/>
+                <a:ea typeface="Source Han Sans CN" panose="020B0500000000000000" pitchFamily="34" charset="-128"/>
+                <a:cs typeface="Century Gothic"/>
+              </a:rPr>
+              <a:t>would be hugely complex.</a:t>
             </a:r>
             <a:endParaRPr sz="1000" dirty="0">
               <a:latin typeface="Source Han Sans CN" panose="020B0500000000000000" pitchFamily="34" charset="-128"/>
@@ -8672,26 +8753,15 @@
               </a:tabLst>
             </a:pPr>
             <a:r>
-              <a:rPr sz="1000" b="1" dirty="0">
-                <a:solidFill>
-                  <a:srgbClr val="231F20"/>
-                </a:solidFill>
-                <a:latin typeface="Source Han Sans CN" panose="020B0500000000000000" pitchFamily="34" charset="-128"/>
-                <a:ea typeface="Source Han Sans CN" panose="020B0500000000000000" pitchFamily="34" charset="-128"/>
-                <a:cs typeface="Century Gothic"/>
-              </a:rPr>
-              <a:t>Interoperability: </a:t>
-            </a:r>
-            <a:r>
-              <a:rPr sz="1000" dirty="0">
-                <a:solidFill>
-                  <a:srgbClr val="231F20"/>
-                </a:solidFill>
-                <a:latin typeface="Source Han Sans CN" panose="020B0500000000000000" pitchFamily="34" charset="-128"/>
-                <a:ea typeface="Source Han Sans CN" panose="020B0500000000000000" pitchFamily="34" charset="-128"/>
-                <a:cs typeface="Century Gothic"/>
-              </a:rPr>
-              <a:t>The software</a:t>
+              <a:rPr sz="1000" dirty="0">
+                <a:solidFill>
+                  <a:srgbClr val="231F20"/>
+                </a:solidFill>
+                <a:latin typeface="Source Han Sans CN" panose="020B0500000000000000" pitchFamily="34" charset="-128"/>
+                <a:ea typeface="Source Han Sans CN" panose="020B0500000000000000" pitchFamily="34" charset="-128"/>
+                <a:cs typeface="Century Gothic"/>
+              </a:rPr>
+              <a:t>Interoperability: The software</a:t>
             </a:r>
             <a:r>
               <a:rPr lang="zh-CN" altLang="en-US" sz="1000" dirty="0">
@@ -8780,26 +8850,15 @@
               </a:tabLst>
             </a:pPr>
             <a:r>
-              <a:rPr sz="1000" b="1" dirty="0">
-                <a:solidFill>
-                  <a:srgbClr val="231F20"/>
-                </a:solidFill>
-                <a:latin typeface="Source Han Sans CN" panose="020B0500000000000000" pitchFamily="34" charset="-128"/>
-                <a:ea typeface="Source Han Sans CN" panose="020B0500000000000000" pitchFamily="34" charset="-128"/>
-                <a:cs typeface="Century Gothic"/>
-              </a:rPr>
-              <a:t>Safety: </a:t>
-            </a:r>
-            <a:r>
-              <a:rPr sz="1000" dirty="0">
-                <a:solidFill>
-                  <a:srgbClr val="231F20"/>
-                </a:solidFill>
-                <a:latin typeface="Source Han Sans CN" panose="020B0500000000000000" pitchFamily="34" charset="-128"/>
-                <a:ea typeface="Source Han Sans CN" panose="020B0500000000000000" pitchFamily="34" charset="-128"/>
-                <a:cs typeface="Century Gothic"/>
-              </a:rPr>
-              <a:t>It would need to comply with</a:t>
+              <a:rPr sz="1000" dirty="0">
+                <a:solidFill>
+                  <a:srgbClr val="231F20"/>
+                </a:solidFill>
+                <a:latin typeface="Source Han Sans CN" panose="020B0500000000000000" pitchFamily="34" charset="-128"/>
+                <a:ea typeface="Source Han Sans CN" panose="020B0500000000000000" pitchFamily="34" charset="-128"/>
+                <a:cs typeface="Century Gothic"/>
+              </a:rPr>
+              <a:t>Safety: It would need to comply with</a:t>
             </a:r>
             <a:r>
               <a:rPr lang="zh-CN" altLang="en-US" sz="1000" dirty="0">
@@ -8844,6 +8903,59 @@
                 <a:cs typeface="Century Gothic"/>
               </a:rPr>
               <a:t>regionally.</a:t>
+            </a:r>
+            <a:endParaRPr lang="en-US" sz="1000" dirty="0">
+              <a:solidFill>
+                <a:srgbClr val="231F20"/>
+              </a:solidFill>
+              <a:latin typeface="Source Han Sans CN" panose="020B0500000000000000" pitchFamily="34" charset="-128"/>
+              <a:ea typeface="Source Han Sans CN" panose="020B0500000000000000" pitchFamily="34" charset="-128"/>
+              <a:cs typeface="Century Gothic"/>
+            </a:endParaRPr>
+          </a:p>
+          <a:p>
+            <a:pPr marL="152400" marR="107314" indent="-114300" algn="l">
+              <a:lnSpc>
+                <a:spcPct val="116700"/>
+              </a:lnSpc>
+              <a:buClr>
+                <a:srgbClr val="F58344"/>
+              </a:buClr>
+              <a:buFont typeface="Century Gothic"/>
+              <a:buChar char="•"/>
+              <a:tabLst>
+                <a:tab pos="152400" algn="l"/>
+              </a:tabLst>
+            </a:pPr>
+            <a:r>
+              <a:rPr lang="en" altLang="zh-CN" sz="1000" dirty="0">
+                <a:solidFill>
+                  <a:srgbClr val="231F20"/>
+                </a:solidFill>
+                <a:latin typeface="Source Han Sans CN" panose="020B0500000000000000" pitchFamily="34" charset="-128"/>
+                <a:ea typeface="Source Han Sans CN" panose="020B0500000000000000" pitchFamily="34" charset="-128"/>
+                <a:cs typeface="Century Gothic"/>
+              </a:rPr>
+              <a:t>Cybersecurity: A significant enough concern to recruit government agencies and automotive companies to work on creating protected environments</a:t>
+            </a:r>
+            <a:r>
+              <a:rPr lang="en" altLang="zh-CN" sz="1000" dirty="0">
+                <a:latin typeface="Source Han Sans CN" panose="020B0500000000000000" pitchFamily="34" charset="-128"/>
+                <a:ea typeface="Source Han Sans CN" panose="020B0500000000000000" pitchFamily="34" charset="-128"/>
+                <a:cs typeface="Century Gothic"/>
+              </a:rPr>
+              <a:t> </a:t>
+            </a:r>
+            <a:r>
+              <a:rPr lang="en" altLang="zh-CN" sz="1000" dirty="0">
+                <a:solidFill>
+                  <a:srgbClr val="231F20"/>
+                </a:solidFill>
+                <a:latin typeface="Source Han Sans CN" panose="020B0500000000000000" pitchFamily="34" charset="-128"/>
+                <a:ea typeface="Source Han Sans CN" panose="020B0500000000000000" pitchFamily="34" charset="-128"/>
+                <a:cs typeface="Century Gothic"/>
+              </a:rPr>
+              <a:t>for both the upload and download of updates, traffic information, diagnostic details and more.</a:t>
             </a:r>
             <a:endParaRPr sz="1000" dirty="0">
               <a:latin typeface="Source Han Sans CN" panose="020B0500000000000000" pitchFamily="34" charset="-128"/>
@@ -8881,8 +8993,8 @@
         </p:nvSpPr>
         <p:spPr>
           <a:xfrm>
-            <a:off x="4121420" y="3470400"/>
-            <a:ext cx="2749550" cy="4492448"/>
+            <a:off x="4122372" y="3290333"/>
+            <a:ext cx="2749550" cy="3232616"/>
           </a:xfrm>
           <a:prstGeom prst="rect">
             <a:avLst/>
@@ -8893,62 +9005,6 @@
             <a:spAutoFit/>
           </a:bodyPr>
           <a:lstStyle/>
-          <a:p>
-            <a:pPr marL="12700" marR="5080" algn="l">
-              <a:lnSpc>
-                <a:spcPct val="116700"/>
-              </a:lnSpc>
-              <a:spcBef>
-                <a:spcPts val="1395"/>
-              </a:spcBef>
-            </a:pPr>
-            <a:r>
-              <a:rPr lang="en" altLang="zh-CN" sz="1000" b="1" dirty="0">
-                <a:solidFill>
-                  <a:srgbClr val="231F20"/>
-                </a:solidFill>
-                <a:latin typeface="Source Han Sans CN" panose="020B0500000000000000" pitchFamily="34" charset="-128"/>
-                <a:ea typeface="Source Han Sans CN" panose="020B0500000000000000" pitchFamily="34" charset="-128"/>
-                <a:cs typeface="Century Gothic"/>
-              </a:rPr>
-              <a:t>Cybersecurity: </a:t>
-            </a:r>
-            <a:r>
-              <a:rPr lang="en" altLang="zh-CN" sz="1000" dirty="0">
-                <a:solidFill>
-                  <a:srgbClr val="231F20"/>
-                </a:solidFill>
-                <a:latin typeface="Source Han Sans CN" panose="020B0500000000000000" pitchFamily="34" charset="-128"/>
-                <a:ea typeface="Source Han Sans CN" panose="020B0500000000000000" pitchFamily="34" charset="-128"/>
-                <a:cs typeface="Century Gothic"/>
-              </a:rPr>
-              <a:t>A significant enough concern to recruit government agencies and automotive companies to work on creating protected environments</a:t>
-            </a:r>
-            <a:r>
-              <a:rPr lang="en" altLang="zh-CN" sz="1000" dirty="0">
-                <a:latin typeface="Source Han Sans CN" panose="020B0500000000000000" pitchFamily="34" charset="-128"/>
-                <a:ea typeface="Source Han Sans CN" panose="020B0500000000000000" pitchFamily="34" charset="-128"/>
-                <a:cs typeface="Century Gothic"/>
-              </a:rPr>
-              <a:t> </a:t>
-            </a:r>
-            <a:r>
-              <a:rPr lang="en" altLang="zh-CN" sz="1000" dirty="0">
-                <a:solidFill>
-                  <a:srgbClr val="231F20"/>
-                </a:solidFill>
-                <a:latin typeface="Source Han Sans CN" panose="020B0500000000000000" pitchFamily="34" charset="-128"/>
-                <a:ea typeface="Source Han Sans CN" panose="020B0500000000000000" pitchFamily="34" charset="-128"/>
-                <a:cs typeface="Century Gothic"/>
-              </a:rPr>
-              <a:t>for both the upload and download of updates, traffic information, diagnostic details and more.</a:t>
-            </a:r>
-            <a:endParaRPr lang="en" altLang="zh-CN" sz="1000" dirty="0">
-              <a:latin typeface="Source Han Sans CN" panose="020B0500000000000000" pitchFamily="34" charset="-128"/>
-              <a:ea typeface="Source Han Sans CN" panose="020B0500000000000000" pitchFamily="34" charset="-128"/>
-              <a:cs typeface="Century Gothic"/>
-            </a:endParaRPr>
-          </a:p>
           <a:p>
             <a:pPr marL="12700" marR="5080" algn="l">
               <a:lnSpc>
@@ -10238,7 +10294,7 @@
         </p:nvSpPr>
         <p:spPr>
           <a:xfrm>
-            <a:off x="4121420" y="8315323"/>
+            <a:off x="4117834" y="7993205"/>
             <a:ext cx="2751455" cy="771301"/>
           </a:xfrm>
           <a:prstGeom prst="rect">
@@ -11197,8 +11253,40 @@
                 <a:ea typeface="Source Han Sans CN" panose="020B0500000000000000" pitchFamily="34" charset="-128"/>
                 <a:cs typeface="Century Gothic"/>
               </a:rPr>
-              <a:t>one out of almost 600 Linux distributions.
-Their criteria: a hardened, supported, enterprise version that would be flexible, reliable</a:t>
+              <a:t>one out of almost 600 Linux distributions.</a:t>
+            </a:r>
+            <a:r>
+              <a:rPr lang="zh-CN" altLang="en-US" sz="1000">
+                <a:solidFill>
+                  <a:srgbClr val="231F20"/>
+                </a:solidFill>
+                <a:latin typeface="Source Han Sans CN" panose="020B0500000000000000" pitchFamily="34" charset="-128"/>
+                <a:ea typeface="Source Han Sans CN" panose="020B0500000000000000" pitchFamily="34" charset="-128"/>
+                <a:cs typeface="Century Gothic"/>
+              </a:rPr>
+              <a:t> </a:t>
+            </a:r>
+            <a:r>
+              <a:rPr sz="1000">
+                <a:solidFill>
+                  <a:srgbClr val="231F20"/>
+                </a:solidFill>
+                <a:latin typeface="Source Han Sans CN" panose="020B0500000000000000" pitchFamily="34" charset="-128"/>
+                <a:ea typeface="Source Han Sans CN" panose="020B0500000000000000" pitchFamily="34" charset="-128"/>
+                <a:cs typeface="Century Gothic"/>
+              </a:rPr>
+              <a:t>Their </a:t>
+            </a:r>
+            <a:r>
+              <a:rPr sz="1000" dirty="0">
+                <a:solidFill>
+                  <a:srgbClr val="231F20"/>
+                </a:solidFill>
+                <a:latin typeface="Source Han Sans CN" panose="020B0500000000000000" pitchFamily="34" charset="-128"/>
+                <a:ea typeface="Source Han Sans CN" panose="020B0500000000000000" pitchFamily="34" charset="-128"/>
+                <a:cs typeface="Century Gothic"/>
+              </a:rPr>
+              <a:t>criteria: a hardened, supported, enterprise version that would be flexible, reliable</a:t>
             </a:r>
             <a:r>
               <a:rPr lang="zh-CN" altLang="en-US" sz="1000" dirty="0">
@@ -11636,7 +11724,7 @@
         </p:nvSpPr>
         <p:spPr>
           <a:xfrm>
-            <a:off x="4138851" y="883345"/>
+            <a:off x="4120770" y="1154235"/>
             <a:ext cx="2759075" cy="8132996"/>
           </a:xfrm>
           <a:prstGeom prst="rect">
@@ -12672,8 +12760,18 @@
                 <a:ea typeface="Source Han Sans CN" panose="020B0500000000000000" pitchFamily="34" charset="-128"/>
                 <a:cs typeface="Century Gothic"/>
               </a:rPr>
-              <a:t>support for 15 years, allows businesses like
-</a:t>
+              <a:t>support for 15 years, allows businesses like</a:t>
+            </a:r>
+            <a:r>
+              <a:rPr lang="zh-CN" altLang="en-US" sz="1000" dirty="0">
+                <a:solidFill>
+                  <a:srgbClr val="231F20"/>
+                </a:solidFill>
+                <a:latin typeface="Source Han Sans CN" panose="020B0500000000000000" pitchFamily="34" charset="-128"/>
+                <a:ea typeface="Source Han Sans CN" panose="020B0500000000000000" pitchFamily="34" charset="-128"/>
+                <a:cs typeface="Century Gothic"/>
+              </a:rPr>
+              <a:t> </a:t>
             </a:r>
             <a:r>
               <a:rPr lang="en" altLang="zh-CN" sz="1000" dirty="0" err="1">
@@ -13062,15 +13160,15 @@
         </p:nvSpPr>
         <p:spPr>
           <a:xfrm>
-            <a:off x="798702" y="3398500"/>
-            <a:ext cx="6174995" cy="5820079"/>
+            <a:off x="731197" y="3429000"/>
+            <a:ext cx="3087498" cy="6272423"/>
           </a:xfrm>
           <a:prstGeom prst="rect">
             <a:avLst/>
           </a:prstGeom>
         </p:spPr>
         <p:txBody>
-          <a:bodyPr vert="horz" wrap="square" lIns="0" tIns="12700" rIns="0" bIns="0" numCol="2" spcCol="360000" rtlCol="0">
+          <a:bodyPr vert="horz" wrap="square" lIns="0" tIns="12700" rIns="0" bIns="0" numCol="1" spcCol="360000" rtlCol="0">
             <a:spAutoFit/>
           </a:bodyPr>
           <a:lstStyle/>
@@ -13710,217 +13808,6 @@
                 <a:cs typeface="Century Gothic"/>
               </a:rPr>
               <a:t>As a result, auto manufacturers will have the security, connectivity, and reliability needed to take autonomous driving to the next level.</a:t>
-            </a:r>
-            <a:endParaRPr lang="en" altLang="zh-CN" sz="1000" dirty="0">
-              <a:latin typeface="Source Han Sans CN" panose="020B0500000000000000" pitchFamily="34" charset="-128"/>
-              <a:ea typeface="Source Han Sans CN" panose="020B0500000000000000" pitchFamily="34" charset="-128"/>
-              <a:cs typeface="Century Gothic"/>
-            </a:endParaRPr>
-          </a:p>
-          <a:p>
-            <a:pPr algn="l">
-              <a:lnSpc>
-                <a:spcPct val="100000"/>
-              </a:lnSpc>
-              <a:spcBef>
-                <a:spcPts val="5"/>
-              </a:spcBef>
-            </a:pPr>
-            <a:endParaRPr lang="en" altLang="zh-CN" sz="1300" dirty="0">
-              <a:latin typeface="Source Han Sans CN" panose="020B0500000000000000" pitchFamily="34" charset="-128"/>
-              <a:ea typeface="Source Han Sans CN" panose="020B0500000000000000" pitchFamily="34" charset="-128"/>
-              <a:cs typeface="Century Gothic"/>
-            </a:endParaRPr>
-          </a:p>
-          <a:p>
-            <a:pPr marL="12700" algn="l">
-              <a:lnSpc>
-                <a:spcPct val="100000"/>
-              </a:lnSpc>
-            </a:pPr>
-            <a:r>
-              <a:rPr lang="en" altLang="zh-CN" sz="1000" b="1" dirty="0">
-                <a:solidFill>
-                  <a:srgbClr val="231F20"/>
-                </a:solidFill>
-                <a:latin typeface="Source Han Sans CN" panose="020B0500000000000000" pitchFamily="34" charset="-128"/>
-                <a:ea typeface="Source Han Sans CN" panose="020B0500000000000000" pitchFamily="34" charset="-128"/>
-                <a:cs typeface="Century Gothic"/>
-              </a:rPr>
-              <a:t>Conclusion</a:t>
-            </a:r>
-            <a:endParaRPr lang="en" altLang="zh-CN" sz="1000" dirty="0">
-              <a:latin typeface="Source Han Sans CN" panose="020B0500000000000000" pitchFamily="34" charset="-128"/>
-              <a:ea typeface="Source Han Sans CN" panose="020B0500000000000000" pitchFamily="34" charset="-128"/>
-              <a:cs typeface="Century Gothic"/>
-            </a:endParaRPr>
-          </a:p>
-          <a:p>
-            <a:pPr marL="12700" marR="5080" algn="l">
-              <a:lnSpc>
-                <a:spcPct val="116700"/>
-              </a:lnSpc>
-              <a:spcBef>
-                <a:spcPts val="1400"/>
-              </a:spcBef>
-            </a:pPr>
-            <a:r>
-              <a:rPr lang="en" altLang="zh-CN" sz="1000" dirty="0">
-                <a:solidFill>
-                  <a:srgbClr val="231F20"/>
-                </a:solidFill>
-                <a:latin typeface="Source Han Sans CN" panose="020B0500000000000000" pitchFamily="34" charset="-128"/>
-                <a:ea typeface="Source Han Sans CN" panose="020B0500000000000000" pitchFamily="34" charset="-128"/>
-                <a:cs typeface="Century Gothic"/>
-              </a:rPr>
-              <a:t>When it comes to autonomous driving, there is no room for error. Consumers will not accept uncertainty from autonomous vehicles in the same way they tolerate unpredictability from other human drivers.</a:t>
-            </a:r>
-            <a:r>
-              <a:rPr lang="zh-CN" altLang="en-US" sz="1000" dirty="0">
-                <a:solidFill>
-                  <a:srgbClr val="231F20"/>
-                </a:solidFill>
-                <a:latin typeface="Source Han Sans CN" panose="020B0500000000000000" pitchFamily="34" charset="-128"/>
-                <a:ea typeface="Source Han Sans CN" panose="020B0500000000000000" pitchFamily="34" charset="-128"/>
-                <a:cs typeface="Century Gothic"/>
-              </a:rPr>
-              <a:t> </a:t>
-            </a:r>
-            <a:r>
-              <a:rPr lang="en" altLang="zh-CN" sz="1000" dirty="0">
-                <a:solidFill>
-                  <a:srgbClr val="231F20"/>
-                </a:solidFill>
-                <a:latin typeface="Source Han Sans CN" panose="020B0500000000000000" pitchFamily="34" charset="-128"/>
-                <a:ea typeface="Source Han Sans CN" panose="020B0500000000000000" pitchFamily="34" charset="-128"/>
-                <a:cs typeface="Century Gothic"/>
-              </a:rPr>
-              <a:t>Faulty systems could overturn the industry direction overnight. As the largest independent open</a:t>
-            </a:r>
-            <a:r>
-              <a:rPr lang="en-US" altLang="zh-CN" sz="1000" dirty="0">
-                <a:solidFill>
-                  <a:srgbClr val="231F20"/>
-                </a:solidFill>
-                <a:latin typeface="Source Han Sans CN" panose="020B0500000000000000" pitchFamily="34" charset="-128"/>
-                <a:ea typeface="Source Han Sans CN" panose="020B0500000000000000" pitchFamily="34" charset="-128"/>
-                <a:cs typeface="Century Gothic"/>
-              </a:rPr>
-              <a:t>-</a:t>
-            </a:r>
-            <a:r>
-              <a:rPr lang="en" altLang="zh-CN" sz="1000" dirty="0">
-                <a:solidFill>
-                  <a:srgbClr val="231F20"/>
-                </a:solidFill>
-                <a:latin typeface="Source Han Sans CN" panose="020B0500000000000000" pitchFamily="34" charset="-128"/>
-                <a:ea typeface="Source Han Sans CN" panose="020B0500000000000000" pitchFamily="34" charset="-128"/>
-                <a:cs typeface="Century Gothic"/>
-              </a:rPr>
-              <a:t>source company in the world with a global partner ecosystem and an open</a:t>
-            </a:r>
-            <a:r>
-              <a:rPr lang="en-US" altLang="zh-CN" sz="1000" dirty="0">
-                <a:solidFill>
-                  <a:srgbClr val="231F20"/>
-                </a:solidFill>
-                <a:latin typeface="Source Han Sans CN" panose="020B0500000000000000" pitchFamily="34" charset="-128"/>
-                <a:ea typeface="Source Han Sans CN" panose="020B0500000000000000" pitchFamily="34" charset="-128"/>
-                <a:cs typeface="Century Gothic"/>
-              </a:rPr>
-              <a:t>-</a:t>
-            </a:r>
-            <a:r>
-              <a:rPr lang="en" altLang="zh-CN" sz="1000" dirty="0">
-                <a:solidFill>
-                  <a:srgbClr val="231F20"/>
-                </a:solidFill>
-                <a:latin typeface="Source Han Sans CN" panose="020B0500000000000000" pitchFamily="34" charset="-128"/>
-                <a:ea typeface="Source Han Sans CN" panose="020B0500000000000000" pitchFamily="34" charset="-128"/>
-                <a:cs typeface="Century Gothic"/>
-              </a:rPr>
-              <a:t>source ethos to help its customers and partners solve complex problems across a wide range of industries, SUSE is committed to helping </a:t>
-            </a:r>
-            <a:r>
-              <a:rPr lang="en" altLang="zh-CN" sz="1000" dirty="0" err="1">
-                <a:solidFill>
-                  <a:srgbClr val="231F20"/>
-                </a:solidFill>
-                <a:latin typeface="Source Han Sans CN" panose="020B0500000000000000" pitchFamily="34" charset="-128"/>
-                <a:ea typeface="Source Han Sans CN" panose="020B0500000000000000" pitchFamily="34" charset="-128"/>
-                <a:cs typeface="Century Gothic"/>
-              </a:rPr>
-              <a:t>Elektrobit</a:t>
-            </a:r>
-            <a:r>
-              <a:rPr lang="en" altLang="zh-CN" sz="1000" dirty="0">
-                <a:solidFill>
-                  <a:srgbClr val="231F20"/>
-                </a:solidFill>
-                <a:latin typeface="Source Han Sans CN" panose="020B0500000000000000" pitchFamily="34" charset="-128"/>
-                <a:ea typeface="Source Han Sans CN" panose="020B0500000000000000" pitchFamily="34" charset="-128"/>
-                <a:cs typeface="Century Gothic"/>
-              </a:rPr>
-              <a:t> develop Safety Linux carefully and deliberately to foster global confidence in adopting driving automation.</a:t>
-            </a:r>
-            <a:endParaRPr lang="en" altLang="zh-CN" sz="1000" dirty="0">
-              <a:latin typeface="Source Han Sans CN" panose="020B0500000000000000" pitchFamily="34" charset="-128"/>
-              <a:ea typeface="Source Han Sans CN" panose="020B0500000000000000" pitchFamily="34" charset="-128"/>
-              <a:cs typeface="Century Gothic"/>
-            </a:endParaRPr>
-          </a:p>
-          <a:p>
-            <a:pPr marL="12700" marR="5080" algn="l">
-              <a:lnSpc>
-                <a:spcPct val="116700"/>
-              </a:lnSpc>
-              <a:spcBef>
-                <a:spcPts val="1400"/>
-              </a:spcBef>
-            </a:pPr>
-            <a:r>
-              <a:rPr lang="en" altLang="zh-CN" sz="1000" dirty="0">
-                <a:solidFill>
-                  <a:srgbClr val="231F20"/>
-                </a:solidFill>
-                <a:latin typeface="Source Han Sans CN" panose="020B0500000000000000" pitchFamily="34" charset="-128"/>
-                <a:ea typeface="Source Han Sans CN" panose="020B0500000000000000" pitchFamily="34" charset="-128"/>
-                <a:cs typeface="Century Gothic"/>
-              </a:rPr>
-              <a:t>Manufacturers and vendors only have one shot to do this right, otherwise they could face years of setbacks. Aiming for their greatest chance of success, </a:t>
-            </a:r>
-            <a:r>
-              <a:rPr lang="en" altLang="zh-CN" sz="1000" dirty="0" err="1">
-                <a:solidFill>
-                  <a:srgbClr val="231F20"/>
-                </a:solidFill>
-                <a:latin typeface="Source Han Sans CN" panose="020B0500000000000000" pitchFamily="34" charset="-128"/>
-                <a:ea typeface="Source Han Sans CN" panose="020B0500000000000000" pitchFamily="34" charset="-128"/>
-                <a:cs typeface="Century Gothic"/>
-              </a:rPr>
-              <a:t>Elektrobit</a:t>
-            </a:r>
-            <a:r>
-              <a:rPr lang="en" altLang="zh-CN" sz="1000" dirty="0">
-                <a:solidFill>
-                  <a:srgbClr val="231F20"/>
-                </a:solidFill>
-                <a:latin typeface="Source Han Sans CN" panose="020B0500000000000000" pitchFamily="34" charset="-128"/>
-                <a:ea typeface="Source Han Sans CN" panose="020B0500000000000000" pitchFamily="34" charset="-128"/>
-                <a:cs typeface="Century Gothic"/>
-              </a:rPr>
-              <a:t> decided to leverage the ingenuity of open source through SUSE and is moving forward with confidence</a:t>
-            </a:r>
-            <a:r>
-              <a:rPr lang="en-US" altLang="zh-CN" sz="1000" dirty="0">
-                <a:solidFill>
-                  <a:srgbClr val="231F20"/>
-                </a:solidFill>
-                <a:latin typeface="Source Han Sans CN" panose="020B0500000000000000" pitchFamily="34" charset="-128"/>
-                <a:ea typeface="Source Han Sans CN" panose="020B0500000000000000" pitchFamily="34" charset="-128"/>
-                <a:cs typeface="Century Gothic"/>
-              </a:rPr>
-              <a:t>.</a:t>
             </a:r>
             <a:endParaRPr lang="en" altLang="zh-CN" sz="1000" dirty="0">
               <a:latin typeface="Source Han Sans CN" panose="020B0500000000000000" pitchFamily="34" charset="-128"/>
@@ -13961,7 +13848,7 @@
         <p:spPr>
           <a:xfrm>
             <a:off x="911606" y="1192338"/>
-            <a:ext cx="2726680" cy="1457450"/>
+            <a:ext cx="2726680" cy="1599651"/>
           </a:xfrm>
           <a:prstGeom prst="rect">
             <a:avLst/>
@@ -13973,7 +13860,7 @@
           </a:ln>
         </p:spPr>
         <p:txBody>
-          <a:bodyPr vert="horz" wrap="square" lIns="0" tIns="3175" rIns="0" bIns="0" rtlCol="0">
+          <a:bodyPr vert="horz" wrap="square" lIns="0" tIns="36000" rIns="0" bIns="108000" rtlCol="0">
             <a:spAutoFit/>
           </a:bodyPr>
           <a:lstStyle/>
@@ -14434,6 +14321,230 @@
           </a:p>
         </p:txBody>
       </p:sp>
+      <p:sp>
+        <p:nvSpPr>
+          <p:cNvPr id="3" name="object 2">
+            <a:extLst>
+              <a:ext uri="{FF2B5EF4-FFF2-40B4-BE49-F238E27FC236}">
+                <a16:creationId xmlns:a16="http://schemas.microsoft.com/office/drawing/2014/main" id="{3C3DE85C-E786-AEDB-55BC-1DF7EFF3A850}"/>
+              </a:ext>
+            </a:extLst>
+          </p:cNvPr>
+          <p:cNvSpPr txBox="1"/>
+          <p:nvPr/>
+        </p:nvSpPr>
+        <p:spPr>
+          <a:xfrm>
+            <a:off x="4239190" y="3429000"/>
+            <a:ext cx="3087498" cy="4112344"/>
+          </a:xfrm>
+          <a:prstGeom prst="rect">
+            <a:avLst/>
+          </a:prstGeom>
+        </p:spPr>
+        <p:txBody>
+          <a:bodyPr vert="horz" wrap="square" lIns="0" tIns="12700" rIns="0" bIns="0" numCol="1" spcCol="360000" rtlCol="0">
+            <a:spAutoFit/>
+          </a:bodyPr>
+          <a:lstStyle/>
+          <a:p>
+            <a:pPr marL="12700" algn="l">
+              <a:lnSpc>
+                <a:spcPct val="100000"/>
+              </a:lnSpc>
+            </a:pPr>
+            <a:r>
+              <a:rPr lang="en" altLang="zh-CN" sz="1000" b="1" dirty="0">
+                <a:solidFill>
+                  <a:srgbClr val="231F20"/>
+                </a:solidFill>
+                <a:latin typeface="Source Han Sans CN" panose="020B0500000000000000" pitchFamily="34" charset="-128"/>
+                <a:ea typeface="Source Han Sans CN" panose="020B0500000000000000" pitchFamily="34" charset="-128"/>
+                <a:cs typeface="Century Gothic"/>
+              </a:rPr>
+              <a:t>Conclusion</a:t>
+            </a:r>
+            <a:endParaRPr lang="en" altLang="zh-CN" sz="1000" dirty="0">
+              <a:latin typeface="Source Han Sans CN" panose="020B0500000000000000" pitchFamily="34" charset="-128"/>
+              <a:ea typeface="Source Han Sans CN" panose="020B0500000000000000" pitchFamily="34" charset="-128"/>
+              <a:cs typeface="Century Gothic"/>
+            </a:endParaRPr>
+          </a:p>
+          <a:p>
+            <a:pPr marL="12700" marR="5080" algn="l">
+              <a:lnSpc>
+                <a:spcPct val="116700"/>
+              </a:lnSpc>
+              <a:spcBef>
+                <a:spcPts val="1400"/>
+              </a:spcBef>
+            </a:pPr>
+            <a:r>
+              <a:rPr lang="en" altLang="zh-CN" sz="1000" dirty="0">
+                <a:solidFill>
+                  <a:srgbClr val="231F20"/>
+                </a:solidFill>
+                <a:latin typeface="Source Han Sans CN" panose="020B0500000000000000" pitchFamily="34" charset="-128"/>
+                <a:ea typeface="Source Han Sans CN" panose="020B0500000000000000" pitchFamily="34" charset="-128"/>
+                <a:cs typeface="Century Gothic"/>
+              </a:rPr>
+              <a:t>When it comes to autonomous driving, there is no room for error. Consumers will not accept uncertainty from autonomous vehicles in the same way they tolerate unpredictability from other human drivers.</a:t>
+            </a:r>
+            <a:r>
+              <a:rPr lang="zh-CN" altLang="en-US" sz="1000" dirty="0">
+                <a:solidFill>
+                  <a:srgbClr val="231F20"/>
+                </a:solidFill>
+                <a:latin typeface="Source Han Sans CN" panose="020B0500000000000000" pitchFamily="34" charset="-128"/>
+                <a:ea typeface="Source Han Sans CN" panose="020B0500000000000000" pitchFamily="34" charset="-128"/>
+                <a:cs typeface="Century Gothic"/>
+              </a:rPr>
+              <a:t> </a:t>
+            </a:r>
+            <a:r>
+              <a:rPr lang="en" altLang="zh-CN" sz="1000" dirty="0">
+                <a:solidFill>
+                  <a:srgbClr val="231F20"/>
+                </a:solidFill>
+                <a:latin typeface="Source Han Sans CN" panose="020B0500000000000000" pitchFamily="34" charset="-128"/>
+                <a:ea typeface="Source Han Sans CN" panose="020B0500000000000000" pitchFamily="34" charset="-128"/>
+                <a:cs typeface="Century Gothic"/>
+              </a:rPr>
+              <a:t>Faulty systems could overturn the industry direction overnight. As the largest independent open</a:t>
+            </a:r>
+            <a:r>
+              <a:rPr lang="en-US" altLang="zh-CN" sz="1000" dirty="0">
+                <a:solidFill>
+                  <a:srgbClr val="231F20"/>
+                </a:solidFill>
+                <a:latin typeface="Source Han Sans CN" panose="020B0500000000000000" pitchFamily="34" charset="-128"/>
+                <a:ea typeface="Source Han Sans CN" panose="020B0500000000000000" pitchFamily="34" charset="-128"/>
+                <a:cs typeface="Century Gothic"/>
+              </a:rPr>
+              <a:t>-</a:t>
+            </a:r>
+            <a:r>
+              <a:rPr lang="en" altLang="zh-CN" sz="1000" dirty="0">
+                <a:solidFill>
+                  <a:srgbClr val="231F20"/>
+                </a:solidFill>
+                <a:latin typeface="Source Han Sans CN" panose="020B0500000000000000" pitchFamily="34" charset="-128"/>
+                <a:ea typeface="Source Han Sans CN" panose="020B0500000000000000" pitchFamily="34" charset="-128"/>
+                <a:cs typeface="Century Gothic"/>
+              </a:rPr>
+              <a:t>source company in the world with a global partner ecosystem and an open</a:t>
+            </a:r>
+            <a:r>
+              <a:rPr lang="en-US" altLang="zh-CN" sz="1000" dirty="0">
+                <a:solidFill>
+                  <a:srgbClr val="231F20"/>
+                </a:solidFill>
+                <a:latin typeface="Source Han Sans CN" panose="020B0500000000000000" pitchFamily="34" charset="-128"/>
+                <a:ea typeface="Source Han Sans CN" panose="020B0500000000000000" pitchFamily="34" charset="-128"/>
+                <a:cs typeface="Century Gothic"/>
+              </a:rPr>
+              <a:t>-</a:t>
+            </a:r>
+            <a:r>
+              <a:rPr lang="en" altLang="zh-CN" sz="1000" dirty="0">
+                <a:solidFill>
+                  <a:srgbClr val="231F20"/>
+                </a:solidFill>
+                <a:latin typeface="Source Han Sans CN" panose="020B0500000000000000" pitchFamily="34" charset="-128"/>
+                <a:ea typeface="Source Han Sans CN" panose="020B0500000000000000" pitchFamily="34" charset="-128"/>
+                <a:cs typeface="Century Gothic"/>
+              </a:rPr>
+              <a:t>source ethos to help its customers and partners solve complex problems across a wide range of industries, SUSE is committed to helping </a:t>
+            </a:r>
+            <a:r>
+              <a:rPr lang="en" altLang="zh-CN" sz="1000" dirty="0" err="1">
+                <a:solidFill>
+                  <a:srgbClr val="231F20"/>
+                </a:solidFill>
+                <a:latin typeface="Source Han Sans CN" panose="020B0500000000000000" pitchFamily="34" charset="-128"/>
+                <a:ea typeface="Source Han Sans CN" panose="020B0500000000000000" pitchFamily="34" charset="-128"/>
+                <a:cs typeface="Century Gothic"/>
+              </a:rPr>
+              <a:t>Elektrobit</a:t>
+            </a:r>
+            <a:r>
+              <a:rPr lang="en" altLang="zh-CN" sz="1000" dirty="0">
+                <a:solidFill>
+                  <a:srgbClr val="231F20"/>
+                </a:solidFill>
+                <a:latin typeface="Source Han Sans CN" panose="020B0500000000000000" pitchFamily="34" charset="-128"/>
+                <a:ea typeface="Source Han Sans CN" panose="020B0500000000000000" pitchFamily="34" charset="-128"/>
+                <a:cs typeface="Century Gothic"/>
+              </a:rPr>
+              <a:t> develop Safety Linux carefully and deliberately to foster global confidence in adopting driving automation.</a:t>
+            </a:r>
+            <a:endParaRPr lang="en" altLang="zh-CN" sz="1000" dirty="0">
+              <a:latin typeface="Source Han Sans CN" panose="020B0500000000000000" pitchFamily="34" charset="-128"/>
+              <a:ea typeface="Source Han Sans CN" panose="020B0500000000000000" pitchFamily="34" charset="-128"/>
+              <a:cs typeface="Century Gothic"/>
+            </a:endParaRPr>
+          </a:p>
+          <a:p>
+            <a:pPr marL="12700" marR="5080" algn="l">
+              <a:lnSpc>
+                <a:spcPct val="116700"/>
+              </a:lnSpc>
+              <a:spcBef>
+                <a:spcPts val="1400"/>
+              </a:spcBef>
+            </a:pPr>
+            <a:r>
+              <a:rPr lang="en" altLang="zh-CN" sz="1000" dirty="0">
+                <a:solidFill>
+                  <a:srgbClr val="231F20"/>
+                </a:solidFill>
+                <a:latin typeface="Source Han Sans CN" panose="020B0500000000000000" pitchFamily="34" charset="-128"/>
+                <a:ea typeface="Source Han Sans CN" panose="020B0500000000000000" pitchFamily="34" charset="-128"/>
+                <a:cs typeface="Century Gothic"/>
+              </a:rPr>
+              <a:t>Manufacturers and vendors only have one shot to do this right, otherwise they could face years of setbacks. Aiming for their greatest chance of success, </a:t>
+            </a:r>
+            <a:r>
+              <a:rPr lang="en" altLang="zh-CN" sz="1000" dirty="0" err="1">
+                <a:solidFill>
+                  <a:srgbClr val="231F20"/>
+                </a:solidFill>
+                <a:latin typeface="Source Han Sans CN" panose="020B0500000000000000" pitchFamily="34" charset="-128"/>
+                <a:ea typeface="Source Han Sans CN" panose="020B0500000000000000" pitchFamily="34" charset="-128"/>
+                <a:cs typeface="Century Gothic"/>
+              </a:rPr>
+              <a:t>Elektrobit</a:t>
+            </a:r>
+            <a:r>
+              <a:rPr lang="en" altLang="zh-CN" sz="1000" dirty="0">
+                <a:solidFill>
+                  <a:srgbClr val="231F20"/>
+                </a:solidFill>
+                <a:latin typeface="Source Han Sans CN" panose="020B0500000000000000" pitchFamily="34" charset="-128"/>
+                <a:ea typeface="Source Han Sans CN" panose="020B0500000000000000" pitchFamily="34" charset="-128"/>
+                <a:cs typeface="Century Gothic"/>
+              </a:rPr>
+              <a:t> decided to leverage the ingenuity of open source through SUSE and is moving forward with confidence</a:t>
+            </a:r>
+            <a:r>
+              <a:rPr lang="en-US" altLang="zh-CN" sz="1000" dirty="0">
+                <a:solidFill>
+                  <a:srgbClr val="231F20"/>
+                </a:solidFill>
+                <a:latin typeface="Source Han Sans CN" panose="020B0500000000000000" pitchFamily="34" charset="-128"/>
+                <a:ea typeface="Source Han Sans CN" panose="020B0500000000000000" pitchFamily="34" charset="-128"/>
+                <a:cs typeface="Century Gothic"/>
+              </a:rPr>
+              <a:t>.</a:t>
+            </a:r>
+            <a:endParaRPr lang="en" altLang="zh-CN" sz="1000" dirty="0">
+              <a:latin typeface="Source Han Sans CN" panose="020B0500000000000000" pitchFamily="34" charset="-128"/>
+              <a:ea typeface="Source Han Sans CN" panose="020B0500000000000000" pitchFamily="34" charset="-128"/>
+              <a:cs typeface="Century Gothic"/>
+            </a:endParaRPr>
+          </a:p>
+        </p:txBody>
+      </p:sp>
     </p:spTree>
   </p:cSld>
   <p:clrMapOvr>
@@ -14468,14 +14579,14 @@
         <p:spPr>
           <a:xfrm>
             <a:off x="892555" y="1179635"/>
-            <a:ext cx="2777490" cy="2133600"/>
+            <a:ext cx="2777490" cy="2436739"/>
           </a:xfrm>
           <a:prstGeom prst="rect">
             <a:avLst/>
           </a:prstGeom>
         </p:spPr>
         <p:txBody>
-          <a:bodyPr vert="horz" wrap="square" lIns="0" tIns="12700" rIns="0" bIns="0" rtlCol="0">
+          <a:bodyPr vert="horz" wrap="square" lIns="72000" tIns="72000" rIns="72000" bIns="72000" rtlCol="0">
             <a:spAutoFit/>
           </a:bodyPr>
           <a:lstStyle/>
@@ -14506,13 +14617,20 @@
             </a:endParaRPr>
           </a:p>
           <a:p>
-            <a:pPr algn="l">
+            <a:pPr marL="285750" indent="-285750" algn="l">
               <a:lnSpc>
                 <a:spcPct val="100000"/>
               </a:lnSpc>
               <a:spcBef>
                 <a:spcPts val="5"/>
               </a:spcBef>
+              <a:buClr>
+                <a:schemeClr val="accent6">
+                  <a:lumMod val="75000"/>
+                </a:schemeClr>
+              </a:buClr>
+              <a:buFont typeface="Arial" panose="020B0604020202020204" pitchFamily="34" charset="0"/>
+              <a:buChar char="•"/>
             </a:pPr>
             <a:endParaRPr sz="1300" dirty="0">
               <a:latin typeface="Source Han Sans CN" panose="020B0500000000000000" pitchFamily="34" charset="-128"/>
@@ -14521,22 +14639,18 @@
             </a:endParaRPr>
           </a:p>
           <a:p>
-            <a:pPr marL="12700" algn="l">
+            <a:pPr marL="184150" indent="-171450" algn="l">
               <a:lnSpc>
                 <a:spcPct val="100000"/>
               </a:lnSpc>
+              <a:buClr>
+                <a:schemeClr val="accent6">
+                  <a:lumMod val="75000"/>
+                </a:schemeClr>
+              </a:buClr>
+              <a:buFont typeface="Arial" panose="020B0604020202020204" pitchFamily="34" charset="0"/>
+              <a:buChar char="•"/>
             </a:pPr>
-            <a:r>
-              <a:rPr sz="1000" dirty="0">
-                <a:solidFill>
-                  <a:srgbClr val="F58344"/>
-                </a:solidFill>
-                <a:latin typeface="Source Han Sans CN" panose="020B0500000000000000" pitchFamily="34" charset="-128"/>
-                <a:ea typeface="Source Han Sans CN" panose="020B0500000000000000" pitchFamily="34" charset="-128"/>
-                <a:cs typeface="Century Gothic"/>
-              </a:rPr>
-              <a:t>+ </a:t>
-            </a:r>
             <a:r>
               <a:rPr sz="1000" dirty="0">
                 <a:solidFill>
@@ -14555,25 +14669,21 @@
             </a:endParaRPr>
           </a:p>
           <a:p>
-            <a:pPr marL="12700" algn="l">
+            <a:pPr marL="184150" indent="-171450" algn="l">
               <a:lnSpc>
                 <a:spcPct val="100000"/>
               </a:lnSpc>
               <a:spcBef>
                 <a:spcPts val="200"/>
               </a:spcBef>
+              <a:buClr>
+                <a:schemeClr val="accent6">
+                  <a:lumMod val="75000"/>
+                </a:schemeClr>
+              </a:buClr>
+              <a:buFont typeface="Arial" panose="020B0604020202020204" pitchFamily="34" charset="0"/>
+              <a:buChar char="•"/>
             </a:pPr>
-            <a:r>
-              <a:rPr sz="1000" dirty="0">
-                <a:solidFill>
-                  <a:srgbClr val="F58344"/>
-                </a:solidFill>
-                <a:latin typeface="Source Han Sans CN" panose="020B0500000000000000" pitchFamily="34" charset="-128"/>
-                <a:ea typeface="Source Han Sans CN" panose="020B0500000000000000" pitchFamily="34" charset="-128"/>
-                <a:cs typeface="Century Gothic"/>
-              </a:rPr>
-              <a:t>+ </a:t>
-            </a:r>
             <a:r>
               <a:rPr sz="1000" dirty="0">
                 <a:solidFill>
@@ -14592,25 +14702,21 @@
             </a:endParaRPr>
           </a:p>
           <a:p>
-            <a:pPr marL="12700" algn="l">
+            <a:pPr marL="184150" indent="-171450" algn="l">
               <a:lnSpc>
                 <a:spcPct val="100000"/>
               </a:lnSpc>
               <a:spcBef>
                 <a:spcPts val="200"/>
               </a:spcBef>
+              <a:buClr>
+                <a:schemeClr val="accent6">
+                  <a:lumMod val="75000"/>
+                </a:schemeClr>
+              </a:buClr>
+              <a:buFont typeface="Arial" panose="020B0604020202020204" pitchFamily="34" charset="0"/>
+              <a:buChar char="•"/>
             </a:pPr>
-            <a:r>
-              <a:rPr sz="1000" dirty="0">
-                <a:solidFill>
-                  <a:srgbClr val="F58344"/>
-                </a:solidFill>
-                <a:latin typeface="Source Han Sans CN" panose="020B0500000000000000" pitchFamily="34" charset="-128"/>
-                <a:ea typeface="Source Han Sans CN" panose="020B0500000000000000" pitchFamily="34" charset="-128"/>
-                <a:cs typeface="Century Gothic"/>
-              </a:rPr>
-              <a:t>+ </a:t>
-            </a:r>
             <a:r>
               <a:rPr sz="1000" dirty="0">
                 <a:solidFill>
@@ -14633,40 +14739,46 @@
               <a:lnSpc>
                 <a:spcPct val="116700"/>
               </a:lnSpc>
+              <a:buClr>
+                <a:schemeClr val="accent6">
+                  <a:lumMod val="75000"/>
+                </a:schemeClr>
+              </a:buClr>
+              <a:buFont typeface="Arial" panose="020B0604020202020204" pitchFamily="34" charset="0"/>
+              <a:buChar char="•"/>
             </a:pPr>
             <a:r>
               <a:rPr sz="1000" dirty="0">
                 <a:solidFill>
-                  <a:srgbClr val="F58344"/>
-                </a:solidFill>
-                <a:latin typeface="Source Han Sans CN" panose="020B0500000000000000" pitchFamily="34" charset="-128"/>
-                <a:ea typeface="Source Han Sans CN" panose="020B0500000000000000" pitchFamily="34" charset="-128"/>
-                <a:cs typeface="Century Gothic"/>
-              </a:rPr>
-              <a:t>+</a:t>
-            </a:r>
-            <a:r>
-              <a:rPr lang="zh-CN" altLang="en-US" sz="1000" dirty="0">
-                <a:solidFill>
-                  <a:srgbClr val="F58344"/>
-                </a:solidFill>
-                <a:latin typeface="Source Han Sans CN" panose="020B0500000000000000" pitchFamily="34" charset="-128"/>
-                <a:ea typeface="Source Han Sans CN" panose="020B0500000000000000" pitchFamily="34" charset="-128"/>
-                <a:cs typeface="Century Gothic"/>
-              </a:rPr>
-              <a:t> </a:t>
-            </a:r>
-            <a:r>
-              <a:rPr sz="1000" dirty="0">
-                <a:solidFill>
-                  <a:srgbClr val="231F20"/>
-                </a:solidFill>
-                <a:latin typeface="Source Han Sans CN" panose="020B0500000000000000" pitchFamily="34" charset="-128"/>
-                <a:ea typeface="Source Han Sans CN" panose="020B0500000000000000" pitchFamily="34" charset="-128"/>
-                <a:cs typeface="Century Gothic"/>
-              </a:rPr>
-              <a:t>Truly open source environment—no ven-
-dor lock-in</a:t>
+                  <a:srgbClr val="231F20"/>
+                </a:solidFill>
+                <a:latin typeface="Source Han Sans CN" panose="020B0500000000000000" pitchFamily="34" charset="-128"/>
+                <a:ea typeface="Source Han Sans CN" panose="020B0500000000000000" pitchFamily="34" charset="-128"/>
+                <a:cs typeface="Century Gothic"/>
+              </a:rPr>
+              <a:t>Truly open source environment—</a:t>
+            </a:r>
+            <a:r>
+              <a:rPr sz="1000">
+                <a:solidFill>
+                  <a:srgbClr val="231F20"/>
+                </a:solidFill>
+                <a:latin typeface="Source Han Sans CN" panose="020B0500000000000000" pitchFamily="34" charset="-128"/>
+                <a:ea typeface="Source Han Sans CN" panose="020B0500000000000000" pitchFamily="34" charset="-128"/>
+                <a:cs typeface="Century Gothic"/>
+              </a:rPr>
+              <a:t>no vendor </a:t>
+            </a:r>
+            <a:r>
+              <a:rPr sz="1000" dirty="0">
+                <a:solidFill>
+                  <a:srgbClr val="231F20"/>
+                </a:solidFill>
+                <a:latin typeface="Source Han Sans CN" panose="020B0500000000000000" pitchFamily="34" charset="-128"/>
+                <a:ea typeface="Source Han Sans CN" panose="020B0500000000000000" pitchFamily="34" charset="-128"/>
+                <a:cs typeface="Century Gothic"/>
+              </a:rPr>
+              <a:t>lock-in</a:t>
             </a:r>
             <a:endParaRPr sz="1000" dirty="0">
               <a:latin typeface="Source Han Sans CN" panose="020B0500000000000000" pitchFamily="34" charset="-128"/>
@@ -14675,25 +14787,21 @@
             </a:endParaRPr>
           </a:p>
           <a:p>
-            <a:pPr marL="12700" algn="l">
+            <a:pPr marL="184150" indent="-171450" algn="l">
               <a:lnSpc>
                 <a:spcPct val="100000"/>
               </a:lnSpc>
               <a:spcBef>
                 <a:spcPts val="200"/>
               </a:spcBef>
+              <a:buClr>
+                <a:schemeClr val="accent6">
+                  <a:lumMod val="75000"/>
+                </a:schemeClr>
+              </a:buClr>
+              <a:buFont typeface="Arial" panose="020B0604020202020204" pitchFamily="34" charset="0"/>
+              <a:buChar char="•"/>
             </a:pPr>
-            <a:r>
-              <a:rPr sz="1000" dirty="0">
-                <a:solidFill>
-                  <a:srgbClr val="F58344"/>
-                </a:solidFill>
-                <a:latin typeface="Source Han Sans CN" panose="020B0500000000000000" pitchFamily="34" charset="-128"/>
-                <a:ea typeface="Source Han Sans CN" panose="020B0500000000000000" pitchFamily="34" charset="-128"/>
-                <a:cs typeface="Century Gothic"/>
-              </a:rPr>
-              <a:t>+ </a:t>
-            </a:r>
             <a:r>
               <a:rPr sz="1000" dirty="0">
                 <a:solidFill>
@@ -14712,36 +14820,21 @@
             </a:endParaRPr>
           </a:p>
           <a:p>
-            <a:pPr marL="12700" algn="l">
+            <a:pPr marL="184150" indent="-171450" algn="l">
               <a:lnSpc>
                 <a:spcPct val="100000"/>
               </a:lnSpc>
               <a:spcBef>
                 <a:spcPts val="200"/>
               </a:spcBef>
+              <a:buClr>
+                <a:schemeClr val="accent6">
+                  <a:lumMod val="75000"/>
+                </a:schemeClr>
+              </a:buClr>
+              <a:buFont typeface="Arial" panose="020B0604020202020204" pitchFamily="34" charset="0"/>
+              <a:buChar char="•"/>
             </a:pPr>
-            <a:r>
-              <a:rPr sz="1000" dirty="0">
-                <a:solidFill>
-                  <a:srgbClr val="F58344"/>
-                </a:solidFill>
-                <a:latin typeface="Source Han Sans CN" panose="020B0500000000000000" pitchFamily="34" charset="-128"/>
-                <a:ea typeface="Source Han Sans CN" panose="020B0500000000000000" pitchFamily="34" charset="-128"/>
-                <a:cs typeface="Century Gothic"/>
-              </a:rPr>
-              <a:t>+</a:t>
-            </a:r>
-            <a:r>
-              <a:rPr lang="zh-CN" altLang="en-US" sz="1000" dirty="0">
-                <a:solidFill>
-                  <a:srgbClr val="F58344"/>
-                </a:solidFill>
-                <a:latin typeface="Source Han Sans CN" panose="020B0500000000000000" pitchFamily="34" charset="-128"/>
-                <a:ea typeface="Source Han Sans CN" panose="020B0500000000000000" pitchFamily="34" charset="-128"/>
-                <a:cs typeface="Century Gothic"/>
-              </a:rPr>
-              <a:t> </a:t>
-            </a:r>
             <a:r>
               <a:rPr sz="1000" dirty="0">
                 <a:solidFill>
@@ -14760,25 +14853,21 @@
             </a:endParaRPr>
           </a:p>
           <a:p>
-            <a:pPr marL="12700" algn="l">
+            <a:pPr marL="184150" indent="-171450" algn="l">
               <a:lnSpc>
                 <a:spcPct val="100000"/>
               </a:lnSpc>
               <a:spcBef>
                 <a:spcPts val="200"/>
               </a:spcBef>
+              <a:buClr>
+                <a:schemeClr val="accent6">
+                  <a:lumMod val="75000"/>
+                </a:schemeClr>
+              </a:buClr>
+              <a:buFont typeface="Arial" panose="020B0604020202020204" pitchFamily="34" charset="0"/>
+              <a:buChar char="•"/>
             </a:pPr>
-            <a:r>
-              <a:rPr sz="1000" dirty="0">
-                <a:solidFill>
-                  <a:srgbClr val="F58344"/>
-                </a:solidFill>
-                <a:latin typeface="Source Han Sans CN" panose="020B0500000000000000" pitchFamily="34" charset="-128"/>
-                <a:ea typeface="Source Han Sans CN" panose="020B0500000000000000" pitchFamily="34" charset="-128"/>
-                <a:cs typeface="Century Gothic"/>
-              </a:rPr>
-              <a:t>+ </a:t>
-            </a:r>
             <a:r>
               <a:rPr sz="1000" dirty="0">
                 <a:solidFill>
@@ -14801,39 +14890,46 @@
               <a:lnSpc>
                 <a:spcPct val="116700"/>
               </a:lnSpc>
+              <a:buClr>
+                <a:schemeClr val="accent6">
+                  <a:lumMod val="75000"/>
+                </a:schemeClr>
+              </a:buClr>
+              <a:buFont typeface="Arial" panose="020B0604020202020204" pitchFamily="34" charset="0"/>
+              <a:buChar char="•"/>
             </a:pPr>
             <a:r>
               <a:rPr sz="1000" dirty="0">
                 <a:solidFill>
-                  <a:srgbClr val="F58344"/>
-                </a:solidFill>
-                <a:latin typeface="Source Han Sans CN" panose="020B0500000000000000" pitchFamily="34" charset="-128"/>
-                <a:ea typeface="Source Han Sans CN" panose="020B0500000000000000" pitchFamily="34" charset="-128"/>
-                <a:cs typeface="Century Gothic"/>
-              </a:rPr>
-              <a:t>+</a:t>
-            </a:r>
-            <a:r>
-              <a:rPr lang="zh-CN" altLang="en-US" sz="1000" dirty="0">
-                <a:solidFill>
-                  <a:srgbClr val="F58344"/>
-                </a:solidFill>
-                <a:latin typeface="Source Han Sans CN" panose="020B0500000000000000" pitchFamily="34" charset="-128"/>
-                <a:ea typeface="Source Han Sans CN" panose="020B0500000000000000" pitchFamily="34" charset="-128"/>
-                <a:cs typeface="Century Gothic"/>
-              </a:rPr>
-              <a:t> </a:t>
-            </a:r>
-            <a:r>
-              <a:rPr sz="1000" dirty="0">
-                <a:solidFill>
-                  <a:srgbClr val="231F20"/>
-                </a:solidFill>
-                <a:latin typeface="Source Han Sans CN" panose="020B0500000000000000" pitchFamily="34" charset="-128"/>
-                <a:ea typeface="Source Han Sans CN" panose="020B0500000000000000" pitchFamily="34" charset="-128"/>
-                <a:cs typeface="Century Gothic"/>
-              </a:rPr>
-              <a:t>The creation of a foundation for the future of driving automation—Safety Linux.</a:t>
+                  <a:srgbClr val="231F20"/>
+                </a:solidFill>
+                <a:latin typeface="Source Han Sans CN" panose="020B0500000000000000" pitchFamily="34" charset="-128"/>
+                <a:ea typeface="Source Han Sans CN" panose="020B0500000000000000" pitchFamily="34" charset="-128"/>
+                <a:cs typeface="Century Gothic"/>
+              </a:rPr>
+              <a:t>The creation of a foundation for the future</a:t>
+            </a:r>
+            <a:r>
+              <a:rPr lang="zh-CN" altLang="en-US" sz="1000" dirty="0">
+                <a:solidFill>
+                  <a:srgbClr val="231F20"/>
+                </a:solidFill>
+                <a:latin typeface="Source Han Sans CN" panose="020B0500000000000000" pitchFamily="34" charset="-128"/>
+                <a:ea typeface="Source Han Sans CN" panose="020B0500000000000000" pitchFamily="34" charset="-128"/>
+                <a:cs typeface="Century Gothic"/>
+              </a:rPr>
+              <a:t> </a:t>
+            </a:r>
+            <a:r>
+              <a:rPr sz="1000" dirty="0">
+                <a:solidFill>
+                  <a:srgbClr val="231F20"/>
+                </a:solidFill>
+                <a:latin typeface="Source Han Sans CN" panose="020B0500000000000000" pitchFamily="34" charset="-128"/>
+                <a:ea typeface="Source Han Sans CN" panose="020B0500000000000000" pitchFamily="34" charset="-128"/>
+                <a:cs typeface="Century Gothic"/>
+              </a:rPr>
+              <a:t>of driving automation—Safety Linux.</a:t>
             </a:r>
             <a:endParaRPr sz="1000" dirty="0">
               <a:latin typeface="Source Han Sans CN" panose="020B0500000000000000" pitchFamily="34" charset="-128"/>
@@ -14905,8 +15001,8 @@
         </p:nvSpPr>
         <p:spPr>
           <a:xfrm>
-            <a:off x="892555" y="3827941"/>
-            <a:ext cx="2292350" cy="1367041"/>
+            <a:off x="892554" y="3827941"/>
+            <a:ext cx="2536445" cy="1367041"/>
           </a:xfrm>
           <a:prstGeom prst="rect">
             <a:avLst/>
@@ -15560,21 +15656,14 @@
               </a:rPr>
               <a:t>Innovate</a:t>
             </a:r>
-            <a:endParaRPr lang="en" altLang="zh-CN" sz="4800" dirty="0">
-              <a:latin typeface="Poppins Medium" pitchFamily="2" charset="0"/>
-              <a:ea typeface="Source Han Sans CN" panose="020B0500000000000000" pitchFamily="34" charset="-128"/>
-              <a:cs typeface="Poppins Medium" pitchFamily="2" charset="0"/>
-            </a:endParaRPr>
-          </a:p>
-          <a:p>
-            <a:pPr marL="12700">
-              <a:lnSpc>
-                <a:spcPct val="100000"/>
-              </a:lnSpc>
-              <a:spcBef>
-                <a:spcPts val="100"/>
-              </a:spcBef>
-            </a:pPr>
+            <a:r>
+              <a:rPr lang="zh-CN" altLang="en-US" sz="4800" dirty="0">
+                <a:latin typeface="Poppins Medium" pitchFamily="2" charset="0"/>
+                <a:ea typeface="Source Han Sans CN" panose="020B0500000000000000" pitchFamily="34" charset="-128"/>
+                <a:cs typeface="Poppins Medium" pitchFamily="2" charset="0"/>
+              </a:rPr>
+              <a:t> </a:t>
+            </a:r>
             <a:r>
               <a:rPr sz="4800" dirty="0">
                 <a:solidFill>

</xml_diff>